<commit_message>
added sens. plots ppt
</commit_message>
<xml_diff>
--- a/Exercise_2/Exercie2_slides.pptx
+++ b/Exercise_2/Exercie2_slides.pptx
@@ -5,10 +5,10 @@
     <p:sldMasterId id="2147483648" r:id="rId1"/>
   </p:sldMasterIdLst>
   <p:notesMasterIdLst>
-    <p:notesMasterId r:id="rId20"/>
+    <p:notesMasterId r:id="rId21"/>
   </p:notesMasterIdLst>
   <p:handoutMasterIdLst>
-    <p:handoutMasterId r:id="rId21"/>
+    <p:handoutMasterId r:id="rId22"/>
   </p:handoutMasterIdLst>
   <p:sldIdLst>
     <p:sldId id="256" r:id="rId2"/>
@@ -29,6 +29,7 @@
     <p:sldId id="272" r:id="rId17"/>
     <p:sldId id="265" r:id="rId18"/>
     <p:sldId id="269" r:id="rId19"/>
+    <p:sldId id="279" r:id="rId20"/>
   </p:sldIdLst>
   <p:sldSz cx="12192000" cy="6858000"/>
   <p:notesSz cx="7104063" cy="10234613"/>
@@ -228,7 +229,7 @@
           <a:p>
             <a:fld id="{0F9B84EA-7D68-4D60-9CB1-D50884785D1C}" type="datetimeFigureOut">
               <a:rPr lang="zh-CN" altLang="en-US" smtClean="0"/>
-              <a:t>2024/12/14</a:t>
+              <a:t>2024/12/15</a:t>
             </a:fld>
             <a:endParaRPr lang="zh-CN" altLang="en-US"/>
           </a:p>
@@ -393,7 +394,7 @@
           <a:p>
             <a:fld id="{D6C8D182-E4C8-4120-9249-FC9774456FFA}" type="datetimeFigureOut">
               <a:rPr lang="zh-CN" altLang="en-US" smtClean="0"/>
-              <a:t>2024/12/14</a:t>
+              <a:t>2024/12/15</a:t>
             </a:fld>
             <a:endParaRPr lang="zh-CN" altLang="en-US"/>
           </a:p>
@@ -735,7 +736,7 @@
           <a:p>
             <a:fld id="{760FBDFE-C587-4B4C-A407-44438C67B59E}" type="datetimeFigureOut">
               <a:rPr lang="zh-CN" altLang="en-US" smtClean="0"/>
-              <a:t>2024/12/14</a:t>
+              <a:t>2024/12/15</a:t>
             </a:fld>
             <a:endParaRPr lang="zh-CN" altLang="en-US"/>
           </a:p>
@@ -901,7 +902,7 @@
           <a:p>
             <a:fld id="{760FBDFE-C587-4B4C-A407-44438C67B59E}" type="datetimeFigureOut">
               <a:rPr lang="zh-CN" altLang="en-US" smtClean="0"/>
-              <a:t>2024/12/14</a:t>
+              <a:t>2024/12/15</a:t>
             </a:fld>
             <a:endParaRPr lang="zh-CN" altLang="en-US"/>
           </a:p>
@@ -1201,7 +1202,7 @@
           <a:p>
             <a:fld id="{760FBDFE-C587-4B4C-A407-44438C67B59E}" type="datetimeFigureOut">
               <a:rPr lang="zh-CN" altLang="en-US" smtClean="0"/>
-              <a:t>2024/12/14</a:t>
+              <a:t>2024/12/15</a:t>
             </a:fld>
             <a:endParaRPr lang="zh-CN" altLang="en-US"/>
           </a:p>
@@ -1453,7 +1454,7 @@
           <a:p>
             <a:fld id="{760FBDFE-C587-4B4C-A407-44438C67B59E}" type="datetimeFigureOut">
               <a:rPr lang="zh-CN" altLang="en-US" smtClean="0"/>
-              <a:t>2024/12/14</a:t>
+              <a:t>2024/12/15</a:t>
             </a:fld>
             <a:endParaRPr lang="zh-CN" altLang="en-US"/>
           </a:p>
@@ -1836,7 +1837,7 @@
           <a:p>
             <a:fld id="{760FBDFE-C587-4B4C-A407-44438C67B59E}" type="datetimeFigureOut">
               <a:rPr lang="zh-CN" altLang="en-US" smtClean="0"/>
-              <a:t>2024/12/14</a:t>
+              <a:t>2024/12/15</a:t>
             </a:fld>
             <a:endParaRPr lang="zh-CN" altLang="en-US"/>
           </a:p>
@@ -2203,7 +2204,7 @@
           <a:p>
             <a:fld id="{760FBDFE-C587-4B4C-A407-44438C67B59E}" type="datetimeFigureOut">
               <a:rPr lang="zh-CN" altLang="en-US" smtClean="0"/>
-              <a:t>2024/12/14</a:t>
+              <a:t>2024/12/15</a:t>
             </a:fld>
             <a:endParaRPr lang="zh-CN" altLang="en-US"/>
           </a:p>
@@ -2334,7 +2335,7 @@
           <a:p>
             <a:fld id="{760FBDFE-C587-4B4C-A407-44438C67B59E}" type="datetimeFigureOut">
               <a:rPr lang="zh-CN" altLang="en-US" smtClean="0"/>
-              <a:t>2024/12/14</a:t>
+              <a:t>2024/12/15</a:t>
             </a:fld>
             <a:endParaRPr lang="zh-CN" altLang="en-US"/>
           </a:p>
@@ -2424,7 +2425,7 @@
           <a:p>
             <a:fld id="{760FBDFE-C587-4B4C-A407-44438C67B59E}" type="datetimeFigureOut">
               <a:rPr lang="zh-CN" altLang="en-US" smtClean="0"/>
-              <a:t>2024/12/14</a:t>
+              <a:t>2024/12/15</a:t>
             </a:fld>
             <a:endParaRPr lang="zh-CN" altLang="en-US"/>
           </a:p>
@@ -2688,7 +2689,7 @@
           <a:p>
             <a:fld id="{9EFD9D74-47D9-4702-A33C-335B63B48DBF}" type="datetimeFigureOut">
               <a:rPr lang="zh-CN" altLang="en-US" smtClean="0"/>
-              <a:t>2024/12/14</a:t>
+              <a:t>2024/12/15</a:t>
             </a:fld>
             <a:endParaRPr lang="zh-CN" altLang="en-US" dirty="0"/>
           </a:p>
@@ -2899,7 +2900,7 @@
           <a:p>
             <a:fld id="{760FBDFE-C587-4B4C-A407-44438C67B59E}" type="datetimeFigureOut">
               <a:rPr lang="zh-CN" altLang="en-US" smtClean="0"/>
-              <a:t>2024/12/14</a:t>
+              <a:t>2024/12/15</a:t>
             </a:fld>
             <a:endParaRPr lang="zh-CN" altLang="en-US"/>
           </a:p>
@@ -3112,7 +3113,7 @@
           <a:p>
             <a:fld id="{760FBDFE-C587-4B4C-A407-44438C67B59E}" type="datetimeFigureOut">
               <a:rPr lang="zh-CN" altLang="en-US" smtClean="0"/>
-              <a:t>2024/12/14</a:t>
+              <a:t>2024/12/15</a:t>
             </a:fld>
             <a:endParaRPr lang="zh-CN" altLang="en-US"/>
           </a:p>
@@ -3582,7 +3583,7 @@
           <a:lstStyle/>
           <a:p>
             <a:r>
-              <a:rPr lang="de-DE" altLang="zh-CN">
+              <a:rPr lang="de-DE" altLang="zh-CN" dirty="0">
                 <a:solidFill>
                   <a:srgbClr val="61A5C2"/>
                 </a:solidFill>
@@ -3593,24 +3594,42 @@
           </a:p>
           <a:p>
             <a:r>
-              <a:rPr lang="de-DE" altLang="zh-CN">
-                <a:solidFill>
-                  <a:srgbClr val="61A5C2"/>
-                </a:solidFill>
-                <a:latin typeface="Calibri" charset="0"/>
-              </a:rPr>
-              <a:t>Kristof Dadac - 12105475</a:t>
-            </a:r>
-          </a:p>
-          <a:p>
-            <a:r>
-              <a:rPr lang="de-DE" altLang="zh-CN">
-                <a:solidFill>
-                  <a:srgbClr val="61A5C2"/>
-                </a:solidFill>
-                <a:latin typeface="Calibri" charset="0"/>
-              </a:rPr>
-              <a:t>Florian Engl -</a:t>
+              <a:rPr lang="de-DE" altLang="zh-CN" dirty="0">
+                <a:solidFill>
+                  <a:srgbClr val="61A5C2"/>
+                </a:solidFill>
+                <a:latin typeface="Calibri" charset="0"/>
+              </a:rPr>
+              <a:t>Kristof </a:t>
+            </a:r>
+            <a:r>
+              <a:rPr lang="de-DE" altLang="zh-CN" dirty="0" err="1">
+                <a:solidFill>
+                  <a:srgbClr val="61A5C2"/>
+                </a:solidFill>
+                <a:latin typeface="Calibri" charset="0"/>
+              </a:rPr>
+              <a:t>Dadic</a:t>
+            </a:r>
+            <a:r>
+              <a:rPr lang="de-DE" altLang="zh-CN" dirty="0">
+                <a:solidFill>
+                  <a:srgbClr val="61A5C2"/>
+                </a:solidFill>
+                <a:latin typeface="Calibri" charset="0"/>
+              </a:rPr>
+              <a:t> - 12105475</a:t>
+            </a:r>
+          </a:p>
+          <a:p>
+            <a:r>
+              <a:rPr lang="de-DE" altLang="zh-CN" dirty="0">
+                <a:solidFill>
+                  <a:srgbClr val="61A5C2"/>
+                </a:solidFill>
+                <a:latin typeface="Calibri" charset="0"/>
+              </a:rPr>
+              <a:t>Florian Engl - 12102619</a:t>
             </a:r>
           </a:p>
         </p:txBody>
@@ -3839,8 +3858,8 @@
         </p:blipFill>
         <p:spPr>
           <a:xfrm>
-            <a:off x="480265" y="93802"/>
-            <a:ext cx="3025152" cy="2116048"/>
+            <a:off x="178828" y="808239"/>
+            <a:ext cx="3997363" cy="2796095"/>
           </a:xfrm>
           <a:prstGeom prst="rect">
             <a:avLst/>
@@ -3874,8 +3893,8 @@
         </p:blipFill>
         <p:spPr>
           <a:xfrm>
-            <a:off x="4583424" y="89086"/>
-            <a:ext cx="3025152" cy="2120764"/>
+            <a:off x="4067452" y="808239"/>
+            <a:ext cx="3988474" cy="2796095"/>
           </a:xfrm>
           <a:prstGeom prst="rect">
             <a:avLst/>
@@ -3884,10 +3903,10 @@
       </p:pic>
       <p:pic>
         <p:nvPicPr>
-          <p:cNvPr id="12" name="Grafik 11" descr="Ein Bild, das Text, Reihe, Screenshot, Diagramm enthält.&#10;&#10;Automatisch generierte Beschreibung">
+          <p:cNvPr id="18" name="Grafik 17" descr="Ein Bild, das Text, Diagramm, Reihe, Screenshot enthält.&#10;&#10;Automatisch generierte Beschreibung">
             <a:extLst>
               <a:ext uri="{FF2B5EF4-FFF2-40B4-BE49-F238E27FC236}">
-                <a16:creationId xmlns:a16="http://schemas.microsoft.com/office/drawing/2014/main" id="{43484075-B40D-4F18-1D14-CC2FB9D50139}"/>
+                <a16:creationId xmlns:a16="http://schemas.microsoft.com/office/drawing/2014/main" id="{06192F1C-A63F-5E9C-9C5B-EFDE7BDF3AD0}"/>
               </a:ext>
             </a:extLst>
           </p:cNvPr>
@@ -3904,48 +3923,13 @@
               </a:ext>
             </a:extLst>
           </a:blip>
-          <a:srcRect t="3260"/>
-          <a:stretch/>
-        </p:blipFill>
-        <p:spPr>
-          <a:xfrm>
-            <a:off x="480263" y="2375204"/>
-            <a:ext cx="3025154" cy="2092472"/>
-          </a:xfrm>
-          <a:prstGeom prst="rect">
-            <a:avLst/>
-          </a:prstGeom>
-        </p:spPr>
-      </p:pic>
-      <p:pic>
-        <p:nvPicPr>
-          <p:cNvPr id="18" name="Grafik 17" descr="Ein Bild, das Text, Diagramm, Reihe, Screenshot enthält.&#10;&#10;Automatisch generierte Beschreibung">
-            <a:extLst>
-              <a:ext uri="{FF2B5EF4-FFF2-40B4-BE49-F238E27FC236}">
-                <a16:creationId xmlns:a16="http://schemas.microsoft.com/office/drawing/2014/main" id="{06192F1C-A63F-5E9C-9C5B-EFDE7BDF3AD0}"/>
-              </a:ext>
-            </a:extLst>
-          </p:cNvPr>
-          <p:cNvPicPr>
-            <a:picLocks noChangeAspect="1"/>
-          </p:cNvPicPr>
-          <p:nvPr/>
-        </p:nvPicPr>
-        <p:blipFill>
-          <a:blip r:embed="rId5" cstate="print">
-            <a:extLst>
-              <a:ext uri="{28A0092B-C50C-407E-A947-70E740481C1C}">
-                <a14:useLocalDpi xmlns:a14="http://schemas.microsoft.com/office/drawing/2010/main" val="0"/>
-              </a:ext>
-            </a:extLst>
-          </a:blip>
           <a:srcRect t="2764" b="-811"/>
           <a:stretch/>
         </p:blipFill>
         <p:spPr>
           <a:xfrm>
-            <a:off x="480263" y="4659938"/>
-            <a:ext cx="3025157" cy="2120744"/>
+            <a:off x="178828" y="3833120"/>
+            <a:ext cx="3988516" cy="2796094"/>
           </a:xfrm>
           <a:prstGeom prst="rect">
             <a:avLst/>
@@ -4038,7 +4022,7 @@
           </p:nvPr>
         </p:nvPicPr>
         <p:blipFill>
-          <a:blip r:embed="rId6" cstate="print">
+          <a:blip r:embed="rId5" cstate="print">
             <a:extLst>
               <a:ext uri="{28A0092B-C50C-407E-A947-70E740481C1C}">
                 <a14:useLocalDpi xmlns:a14="http://schemas.microsoft.com/office/drawing/2010/main" val="0"/>
@@ -4050,43 +4034,8 @@
         </p:blipFill>
         <p:spPr>
           <a:xfrm>
-            <a:off x="4591889" y="4659938"/>
-            <a:ext cx="3025154" cy="2114671"/>
-          </a:xfrm>
-          <a:prstGeom prst="rect">
-            <a:avLst/>
-          </a:prstGeom>
-        </p:spPr>
-      </p:pic>
-      <p:pic>
-        <p:nvPicPr>
-          <p:cNvPr id="16" name="Grafik 15" descr="Ein Bild, das Text, Reihe, Diagramm, Screenshot enthält.&#10;&#10;Automatisch generierte Beschreibung">
-            <a:extLst>
-              <a:ext uri="{FF2B5EF4-FFF2-40B4-BE49-F238E27FC236}">
-                <a16:creationId xmlns:a16="http://schemas.microsoft.com/office/drawing/2014/main" id="{5EB3BD17-8820-16FD-A101-5C8B98FE3A92}"/>
-              </a:ext>
-            </a:extLst>
-          </p:cNvPr>
-          <p:cNvPicPr>
-            <a:picLocks noChangeAspect="1"/>
-          </p:cNvPicPr>
-          <p:nvPr/>
-        </p:nvPicPr>
-        <p:blipFill>
-          <a:blip r:embed="rId7" cstate="print">
-            <a:extLst>
-              <a:ext uri="{28A0092B-C50C-407E-A947-70E740481C1C}">
-                <a14:useLocalDpi xmlns:a14="http://schemas.microsoft.com/office/drawing/2010/main" val="0"/>
-              </a:ext>
-            </a:extLst>
-          </a:blip>
-          <a:srcRect t="2171" b="-1"/>
-          <a:stretch/>
-        </p:blipFill>
-        <p:spPr>
-          <a:xfrm>
-            <a:off x="4591889" y="2370975"/>
-            <a:ext cx="3025154" cy="2116049"/>
+            <a:off x="4067452" y="3879103"/>
+            <a:ext cx="3872001" cy="2706642"/>
           </a:xfrm>
           <a:prstGeom prst="rect">
             <a:avLst/>
@@ -4270,8 +4219,8 @@
         </p:blipFill>
         <p:spPr>
           <a:xfrm>
-            <a:off x="3986961" y="665825"/>
-            <a:ext cx="3756216" cy="2622777"/>
+            <a:off x="3986962" y="665825"/>
+            <a:ext cx="3835227" cy="2677946"/>
           </a:xfrm>
           <a:prstGeom prst="rect">
             <a:avLst/>
@@ -4340,7 +4289,7 @@
         </p:blipFill>
         <p:spPr>
           <a:xfrm>
-            <a:off x="222151" y="3781725"/>
+            <a:off x="222152" y="3781725"/>
             <a:ext cx="3764809" cy="2625184"/>
           </a:xfrm>
           <a:prstGeom prst="rect">
@@ -4540,10 +4489,10 @@
       </p:sp>
       <p:pic>
         <p:nvPicPr>
-          <p:cNvPr id="4" name="Grafik 3" descr="Ein Bild, das Text, Reihe, Screenshot, Diagramm enthält.&#10;&#10;Automatisch generierte Beschreibung">
+          <p:cNvPr id="6" name="Grafik 5" descr="Ein Bild, das Text, Screenshot, Reihe, Diagramm enthält.&#10;&#10;Automatisch generierte Beschreibung">
             <a:extLst>
               <a:ext uri="{FF2B5EF4-FFF2-40B4-BE49-F238E27FC236}">
-                <a16:creationId xmlns:a16="http://schemas.microsoft.com/office/drawing/2014/main" id="{3EC91226-22CA-A7E3-DF99-CE75E3AF4002}"/>
+                <a16:creationId xmlns:a16="http://schemas.microsoft.com/office/drawing/2014/main" id="{271DA694-06EF-2E11-1896-6161B2A59CED}"/>
               </a:ext>
             </a:extLst>
           </p:cNvPr>
@@ -4560,13 +4509,13 @@
               </a:ext>
             </a:extLst>
           </a:blip>
-          <a:srcRect t="2488"/>
+          <a:srcRect t="3155"/>
           <a:stretch/>
         </p:blipFill>
         <p:spPr>
           <a:xfrm>
-            <a:off x="2876091" y="4900474"/>
-            <a:ext cx="2602778" cy="1812876"/>
+            <a:off x="87004" y="3761450"/>
+            <a:ext cx="4041113" cy="2795430"/>
           </a:xfrm>
           <a:prstGeom prst="rect">
             <a:avLst/>
@@ -4575,10 +4524,10 @@
       </p:pic>
       <p:pic>
         <p:nvPicPr>
-          <p:cNvPr id="6" name="Grafik 5" descr="Ein Bild, das Text, Screenshot, Reihe, Diagramm enthält.&#10;&#10;Automatisch generierte Beschreibung">
+          <p:cNvPr id="9" name="Grafik 8" descr="Ein Bild, das Text, Reihe, Diagramm, Screenshot enthält.&#10;&#10;Automatisch generierte Beschreibung">
             <a:extLst>
               <a:ext uri="{FF2B5EF4-FFF2-40B4-BE49-F238E27FC236}">
-                <a16:creationId xmlns:a16="http://schemas.microsoft.com/office/drawing/2014/main" id="{271DA694-06EF-2E11-1896-6161B2A59CED}"/>
+                <a16:creationId xmlns:a16="http://schemas.microsoft.com/office/drawing/2014/main" id="{3885F3B8-071F-B9F8-5AAB-222FC892F292}"/>
               </a:ext>
             </a:extLst>
           </p:cNvPr>
@@ -4595,13 +4544,13 @@
               </a:ext>
             </a:extLst>
           </a:blip>
-          <a:srcRect t="3155"/>
+          <a:srcRect t="2379"/>
           <a:stretch/>
         </p:blipFill>
         <p:spPr>
           <a:xfrm>
-            <a:off x="393130" y="2702091"/>
-            <a:ext cx="3018447" cy="2088003"/>
+            <a:off x="4117226" y="3761449"/>
+            <a:ext cx="3946659" cy="2751987"/>
           </a:xfrm>
           <a:prstGeom prst="rect">
             <a:avLst/>
@@ -4610,10 +4559,10 @@
       </p:pic>
       <p:pic>
         <p:nvPicPr>
-          <p:cNvPr id="9" name="Grafik 8" descr="Ein Bild, das Text, Reihe, Diagramm, Screenshot enthält.&#10;&#10;Automatisch generierte Beschreibung">
+          <p:cNvPr id="13" name="Grafik 12" descr="Ein Bild, das Text, Reihe, Diagramm, Screenshot enthält.&#10;&#10;Automatisch generierte Beschreibung">
             <a:extLst>
               <a:ext uri="{FF2B5EF4-FFF2-40B4-BE49-F238E27FC236}">
-                <a16:creationId xmlns:a16="http://schemas.microsoft.com/office/drawing/2014/main" id="{3885F3B8-071F-B9F8-5AAB-222FC892F292}"/>
+                <a16:creationId xmlns:a16="http://schemas.microsoft.com/office/drawing/2014/main" id="{3BCC32E3-3C2B-CC37-433A-04AFEA9CEDE0}"/>
               </a:ext>
             </a:extLst>
           </p:cNvPr>
@@ -4630,13 +4579,13 @@
               </a:ext>
             </a:extLst>
           </a:blip>
-          <a:srcRect t="2379"/>
+          <a:srcRect t="3155"/>
           <a:stretch/>
         </p:blipFill>
         <p:spPr>
           <a:xfrm>
-            <a:off x="4646457" y="2681147"/>
-            <a:ext cx="3058589" cy="2132740"/>
+            <a:off x="4117226" y="481426"/>
+            <a:ext cx="3978312" cy="2751987"/>
           </a:xfrm>
           <a:prstGeom prst="rect">
             <a:avLst/>
@@ -4645,10 +4594,10 @@
       </p:pic>
       <p:pic>
         <p:nvPicPr>
-          <p:cNvPr id="13" name="Grafik 12" descr="Ein Bild, das Text, Reihe, Diagramm, Screenshot enthält.&#10;&#10;Automatisch generierte Beschreibung">
+          <p:cNvPr id="17" name="Grafik 16" descr="Ein Bild, das Text, Diagramm, Reihe, Screenshot enthält.&#10;&#10;Automatisch generierte Beschreibung">
             <a:extLst>
               <a:ext uri="{FF2B5EF4-FFF2-40B4-BE49-F238E27FC236}">
-                <a16:creationId xmlns:a16="http://schemas.microsoft.com/office/drawing/2014/main" id="{3BCC32E3-3C2B-CC37-433A-04AFEA9CEDE0}"/>
+                <a16:creationId xmlns:a16="http://schemas.microsoft.com/office/drawing/2014/main" id="{09F1FBE1-2635-A9ED-D04E-A77350B5742C}"/>
               </a:ext>
             </a:extLst>
           </p:cNvPr>
@@ -4665,48 +4614,13 @@
               </a:ext>
             </a:extLst>
           </a:blip>
-          <a:srcRect t="3155"/>
-          <a:stretch/>
-        </p:blipFill>
-        <p:spPr>
-          <a:xfrm>
-            <a:off x="4686599" y="391171"/>
-            <a:ext cx="3054648" cy="2113045"/>
-          </a:xfrm>
-          <a:prstGeom prst="rect">
-            <a:avLst/>
-          </a:prstGeom>
-        </p:spPr>
-      </p:pic>
-      <p:pic>
-        <p:nvPicPr>
-          <p:cNvPr id="17" name="Grafik 16" descr="Ein Bild, das Text, Diagramm, Reihe, Screenshot enthält.&#10;&#10;Automatisch generierte Beschreibung">
-            <a:extLst>
-              <a:ext uri="{FF2B5EF4-FFF2-40B4-BE49-F238E27FC236}">
-                <a16:creationId xmlns:a16="http://schemas.microsoft.com/office/drawing/2014/main" id="{09F1FBE1-2635-A9ED-D04E-A77350B5742C}"/>
-              </a:ext>
-            </a:extLst>
-          </p:cNvPr>
-          <p:cNvPicPr>
-            <a:picLocks noChangeAspect="1"/>
-          </p:cNvPicPr>
-          <p:nvPr/>
-        </p:nvPicPr>
-        <p:blipFill>
-          <a:blip r:embed="rId6" cstate="print">
-            <a:extLst>
-              <a:ext uri="{28A0092B-C50C-407E-A947-70E740481C1C}">
-                <a14:useLocalDpi xmlns:a14="http://schemas.microsoft.com/office/drawing/2010/main" val="0"/>
-              </a:ext>
-            </a:extLst>
-          </a:blip>
           <a:srcRect t="2185"/>
           <a:stretch/>
         </p:blipFill>
         <p:spPr>
           <a:xfrm>
-            <a:off x="393131" y="391173"/>
-            <a:ext cx="3024327" cy="2113044"/>
+            <a:off x="256005" y="528036"/>
+            <a:ext cx="3872112" cy="2705377"/>
           </a:xfrm>
           <a:prstGeom prst="rect">
             <a:avLst/>
@@ -4910,8 +4824,8 @@
         </p:blipFill>
         <p:spPr>
           <a:xfrm>
-            <a:off x="4159355" y="730186"/>
-            <a:ext cx="3873290" cy="2698814"/>
+            <a:off x="4044681" y="730186"/>
+            <a:ext cx="3987964" cy="2778716"/>
           </a:xfrm>
           <a:prstGeom prst="rect">
             <a:avLst/>
@@ -4945,8 +4859,8 @@
         </p:blipFill>
         <p:spPr>
           <a:xfrm>
-            <a:off x="2356605" y="3746534"/>
-            <a:ext cx="3605500" cy="2512224"/>
+            <a:off x="2088815" y="3826435"/>
+            <a:ext cx="3873290" cy="2698814"/>
           </a:xfrm>
           <a:prstGeom prst="rect">
             <a:avLst/>
@@ -4980,8 +4894,8 @@
         </p:blipFill>
         <p:spPr>
           <a:xfrm>
-            <a:off x="330241" y="730186"/>
-            <a:ext cx="3758618" cy="2618913"/>
+            <a:off x="215569" y="730186"/>
+            <a:ext cx="3873290" cy="2698814"/>
           </a:xfrm>
           <a:prstGeom prst="rect">
             <a:avLst/>
@@ -5115,13 +5029,49 @@
           <a:p>
             <a:pPr algn="ctr" fontAlgn="auto"/>
             <a:r>
-              <a:rPr lang="de-DE" altLang="en-US">
-                <a:solidFill>
-                  <a:srgbClr val="61A5C2"/>
-                </a:solidFill>
-                <a:latin typeface="Calibri" charset="0"/>
-              </a:rPr>
-              <a:t>Cross Validation Restults - Supercoductivity Dataset</a:t>
+              <a:rPr lang="de-DE" altLang="en-US" dirty="0">
+                <a:solidFill>
+                  <a:srgbClr val="61A5C2"/>
+                </a:solidFill>
+                <a:latin typeface="Calibri" charset="0"/>
+              </a:rPr>
+              <a:t>Cross Validation </a:t>
+            </a:r>
+            <a:r>
+              <a:rPr lang="de-DE" altLang="en-US" dirty="0" err="1">
+                <a:solidFill>
+                  <a:srgbClr val="61A5C2"/>
+                </a:solidFill>
+                <a:latin typeface="Calibri" charset="0"/>
+              </a:rPr>
+              <a:t>Results</a:t>
+            </a:r>
+            <a:r>
+              <a:rPr lang="de-DE" altLang="en-US" dirty="0">
+                <a:solidFill>
+                  <a:srgbClr val="61A5C2"/>
+                </a:solidFill>
+                <a:latin typeface="Calibri" charset="0"/>
+              </a:rPr>
+              <a:t> - </a:t>
+            </a:r>
+            <a:r>
+              <a:rPr lang="de-DE" altLang="en-US" dirty="0" err="1">
+                <a:solidFill>
+                  <a:srgbClr val="61A5C2"/>
+                </a:solidFill>
+                <a:latin typeface="Calibri" charset="0"/>
+              </a:rPr>
+              <a:t>Superconductivity</a:t>
+            </a:r>
+            <a:r>
+              <a:rPr lang="de-DE" altLang="en-US" dirty="0">
+                <a:solidFill>
+                  <a:srgbClr val="61A5C2"/>
+                </a:solidFill>
+                <a:latin typeface="Calibri" charset="0"/>
+              </a:rPr>
+              <a:t> Dataset</a:t>
             </a:r>
           </a:p>
         </p:txBody>
@@ -5273,13 +5223,40 @@
           <a:p>
             <a:pPr algn="ctr" fontAlgn="auto"/>
             <a:r>
-              <a:rPr lang="de-DE" altLang="en-US">
-                <a:solidFill>
-                  <a:srgbClr val="61A5C2"/>
-                </a:solidFill>
-                <a:latin typeface="Calibri" charset="0"/>
-              </a:rPr>
-              <a:t>Runtime - Superconductivity</a:t>
+              <a:rPr lang="de-DE" altLang="en-US" dirty="0" err="1">
+                <a:solidFill>
+                  <a:srgbClr val="61A5C2"/>
+                </a:solidFill>
+                <a:latin typeface="Calibri" charset="0"/>
+              </a:rPr>
+              <a:t>Runtime</a:t>
+            </a:r>
+            <a:r>
+              <a:rPr lang="de-DE" altLang="en-US" dirty="0">
+                <a:solidFill>
+                  <a:srgbClr val="61A5C2"/>
+                </a:solidFill>
+                <a:latin typeface="Calibri" charset="0"/>
+              </a:rPr>
+              <a:t> – </a:t>
+            </a:r>
+            <a:r>
+              <a:rPr lang="de-DE" altLang="en-US" dirty="0" err="1">
+                <a:solidFill>
+                  <a:srgbClr val="61A5C2"/>
+                </a:solidFill>
+                <a:latin typeface="Calibri" charset="0"/>
+              </a:rPr>
+              <a:t>Superconductivity</a:t>
+            </a:r>
+            <a:r>
+              <a:rPr lang="de-DE" altLang="en-US" dirty="0">
+                <a:solidFill>
+                  <a:srgbClr val="61A5C2"/>
+                </a:solidFill>
+                <a:latin typeface="Calibri" charset="0"/>
+              </a:rPr>
+              <a:t> Dataset</a:t>
             </a:r>
           </a:p>
         </p:txBody>
@@ -5311,6 +5288,513 @@
         </p:spPr>
       </p:pic>
     </p:spTree>
+  </p:cSld>
+  <p:clrMapOvr>
+    <a:masterClrMapping/>
+  </p:clrMapOvr>
+</p:sld>
+</file>
+
+<file path=ppt/slides/slide19.xml><?xml version="1.0" encoding="utf-8"?>
+<p:sld xmlns:a="http://schemas.openxmlformats.org/drawingml/2006/main" xmlns:r="http://schemas.openxmlformats.org/officeDocument/2006/relationships" xmlns:p="http://schemas.openxmlformats.org/presentationml/2006/main">
+  <p:cSld>
+    <p:spTree>
+      <p:nvGrpSpPr>
+        <p:cNvPr id="1" name=""/>
+        <p:cNvGrpSpPr/>
+        <p:nvPr/>
+      </p:nvGrpSpPr>
+      <p:grpSpPr>
+        <a:xfrm>
+          <a:off x="0" y="0"/>
+          <a:ext cx="0" cy="0"/>
+          <a:chOff x="0" y="0"/>
+          <a:chExt cx="0" cy="0"/>
+        </a:xfrm>
+      </p:grpSpPr>
+      <p:sp>
+        <p:nvSpPr>
+          <p:cNvPr id="2" name="Titel 1">
+            <a:extLst>
+              <a:ext uri="{FF2B5EF4-FFF2-40B4-BE49-F238E27FC236}">
+                <a16:creationId xmlns:a16="http://schemas.microsoft.com/office/drawing/2014/main" id="{E7E230DC-BABC-D56F-55A2-6B881845D4F4}"/>
+              </a:ext>
+            </a:extLst>
+          </p:cNvPr>
+          <p:cNvSpPr>
+            <a:spLocks noGrp="1"/>
+          </p:cNvSpPr>
+          <p:nvPr>
+            <p:ph type="title"/>
+          </p:nvPr>
+        </p:nvSpPr>
+        <p:spPr>
+          <a:xfrm>
+            <a:off x="838200" y="134157"/>
+            <a:ext cx="10515600" cy="1325563"/>
+          </a:xfrm>
+        </p:spPr>
+        <p:txBody>
+          <a:bodyPr/>
+          <a:lstStyle/>
+          <a:p>
+            <a:pPr algn="ctr"/>
+            <a:r>
+              <a:rPr lang="de-AT" dirty="0" err="1">
+                <a:solidFill>
+                  <a:srgbClr val="61A5C2"/>
+                </a:solidFill>
+                <a:latin typeface="Calibri" charset="0"/>
+              </a:rPr>
+              <a:t>Sensitivity</a:t>
+            </a:r>
+            <a:r>
+              <a:rPr lang="de-AT" dirty="0">
+                <a:solidFill>
+                  <a:srgbClr val="61A5C2"/>
+                </a:solidFill>
+                <a:latin typeface="Calibri" charset="0"/>
+              </a:rPr>
+              <a:t> </a:t>
+            </a:r>
+            <a:r>
+              <a:rPr lang="de-AT" dirty="0" err="1">
+                <a:solidFill>
+                  <a:srgbClr val="61A5C2"/>
+                </a:solidFill>
+                <a:latin typeface="Calibri" charset="0"/>
+              </a:rPr>
+              <a:t>min_samples_split</a:t>
+            </a:r>
+            <a:r>
+              <a:rPr lang="de-AT" dirty="0">
+                <a:solidFill>
+                  <a:srgbClr val="61A5C2"/>
+                </a:solidFill>
+                <a:latin typeface="Calibri" charset="0"/>
+              </a:rPr>
+              <a:t>, </a:t>
+            </a:r>
+            <a:r>
+              <a:rPr lang="de-AT" dirty="0" err="1">
+                <a:solidFill>
+                  <a:srgbClr val="61A5C2"/>
+                </a:solidFill>
+                <a:latin typeface="Calibri" charset="0"/>
+              </a:rPr>
+              <a:t>nb_estimators</a:t>
+            </a:r>
+            <a:r>
+              <a:rPr lang="de-AT" dirty="0">
+                <a:solidFill>
+                  <a:srgbClr val="61A5C2"/>
+                </a:solidFill>
+                <a:latin typeface="Calibri" charset="0"/>
+              </a:rPr>
+              <a:t>/</a:t>
+            </a:r>
+            <a:r>
+              <a:rPr lang="de-AT" dirty="0" err="1">
+                <a:solidFill>
+                  <a:srgbClr val="61A5C2"/>
+                </a:solidFill>
+                <a:latin typeface="Calibri" charset="0"/>
+              </a:rPr>
+              <a:t>trees</a:t>
+            </a:r>
+            <a:endParaRPr lang="de-AT" dirty="0">
+              <a:solidFill>
+                <a:srgbClr val="61A5C2"/>
+              </a:solidFill>
+              <a:latin typeface="Calibri" charset="0"/>
+            </a:endParaRPr>
+          </a:p>
+        </p:txBody>
+      </p:sp>
+      <p:sp>
+        <p:nvSpPr>
+          <p:cNvPr id="4" name="Textfeld 3">
+            <a:extLst>
+              <a:ext uri="{FF2B5EF4-FFF2-40B4-BE49-F238E27FC236}">
+                <a16:creationId xmlns:a16="http://schemas.microsoft.com/office/drawing/2014/main" id="{EA3FD169-E32E-655C-66D7-F5E1E817EA5C}"/>
+              </a:ext>
+            </a:extLst>
+          </p:cNvPr>
+          <p:cNvSpPr txBox="1"/>
+          <p:nvPr/>
+        </p:nvSpPr>
+        <p:spPr>
+          <a:xfrm>
+            <a:off x="1544715" y="1275054"/>
+            <a:ext cx="2432845" cy="400110"/>
+          </a:xfrm>
+          <a:prstGeom prst="rect">
+            <a:avLst/>
+          </a:prstGeom>
+          <a:noFill/>
+        </p:spPr>
+        <p:txBody>
+          <a:bodyPr wrap="none" rtlCol="0">
+            <a:spAutoFit/>
+          </a:bodyPr>
+          <a:lstStyle/>
+          <a:p>
+            <a:r>
+              <a:rPr lang="de-AT" sz="2000" b="1" dirty="0" err="1">
+                <a:solidFill>
+                  <a:srgbClr val="61A5C2"/>
+                </a:solidFill>
+                <a:effectLst>
+                  <a:outerShdw blurRad="38100" dist="38100" dir="2700000" algn="tl">
+                    <a:srgbClr val="000000">
+                      <a:alpha val="43137"/>
+                    </a:srgbClr>
+                  </a:outerShdw>
+                </a:effectLst>
+                <a:latin typeface="Calibri" charset="0"/>
+                <a:ea typeface="+mj-ea"/>
+                <a:cs typeface="+mj-cs"/>
+              </a:rPr>
+              <a:t>Our</a:t>
+            </a:r>
+            <a:r>
+              <a:rPr lang="de-AT" sz="2000" b="1" dirty="0">
+                <a:solidFill>
+                  <a:srgbClr val="61A5C2"/>
+                </a:solidFill>
+                <a:effectLst>
+                  <a:outerShdw blurRad="38100" dist="38100" dir="2700000" algn="tl">
+                    <a:srgbClr val="000000">
+                      <a:alpha val="43137"/>
+                    </a:srgbClr>
+                  </a:outerShdw>
+                </a:effectLst>
+                <a:latin typeface="Calibri" charset="0"/>
+                <a:ea typeface="+mj-ea"/>
+                <a:cs typeface="+mj-cs"/>
+              </a:rPr>
+              <a:t> Implementation:</a:t>
+            </a:r>
+          </a:p>
+        </p:txBody>
+      </p:sp>
+      <p:sp>
+        <p:nvSpPr>
+          <p:cNvPr id="5" name="Textfeld 4">
+            <a:extLst>
+              <a:ext uri="{FF2B5EF4-FFF2-40B4-BE49-F238E27FC236}">
+                <a16:creationId xmlns:a16="http://schemas.microsoft.com/office/drawing/2014/main" id="{0CE17C52-5F8C-8B52-DE2A-3AD4E864181D}"/>
+              </a:ext>
+            </a:extLst>
+          </p:cNvPr>
+          <p:cNvSpPr txBox="1"/>
+          <p:nvPr/>
+        </p:nvSpPr>
+        <p:spPr>
+          <a:xfrm>
+            <a:off x="8052487" y="1275054"/>
+            <a:ext cx="1032655" cy="400110"/>
+          </a:xfrm>
+          <a:prstGeom prst="rect">
+            <a:avLst/>
+          </a:prstGeom>
+          <a:noFill/>
+        </p:spPr>
+        <p:txBody>
+          <a:bodyPr wrap="none" rtlCol="0">
+            <a:spAutoFit/>
+          </a:bodyPr>
+          <a:lstStyle/>
+          <a:p>
+            <a:r>
+              <a:rPr lang="de-AT" sz="2000" b="1" dirty="0" err="1">
+                <a:solidFill>
+                  <a:srgbClr val="61A5C2"/>
+                </a:solidFill>
+                <a:effectLst>
+                  <a:outerShdw blurRad="38100" dist="38100" dir="2700000" algn="tl">
+                    <a:srgbClr val="000000">
+                      <a:alpha val="43137"/>
+                    </a:srgbClr>
+                  </a:outerShdw>
+                </a:effectLst>
+                <a:latin typeface="Calibri" charset="0"/>
+                <a:ea typeface="+mj-ea"/>
+                <a:cs typeface="+mj-cs"/>
+              </a:rPr>
+              <a:t>scikit</a:t>
+            </a:r>
+            <a:r>
+              <a:rPr lang="de-AT" sz="2000" b="1" dirty="0">
+                <a:solidFill>
+                  <a:srgbClr val="61A5C2"/>
+                </a:solidFill>
+                <a:effectLst>
+                  <a:outerShdw blurRad="38100" dist="38100" dir="2700000" algn="tl">
+                    <a:srgbClr val="000000">
+                      <a:alpha val="43137"/>
+                    </a:srgbClr>
+                  </a:outerShdw>
+                </a:effectLst>
+                <a:latin typeface="Calibri" charset="0"/>
+                <a:ea typeface="+mj-ea"/>
+                <a:cs typeface="+mj-cs"/>
+              </a:rPr>
+              <a:t> </a:t>
+            </a:r>
+            <a:r>
+              <a:rPr lang="de-AT" sz="2000" b="1" dirty="0" err="1">
+                <a:solidFill>
+                  <a:srgbClr val="61A5C2"/>
+                </a:solidFill>
+                <a:effectLst>
+                  <a:outerShdw blurRad="38100" dist="38100" dir="2700000" algn="tl">
+                    <a:srgbClr val="000000">
+                      <a:alpha val="43137"/>
+                    </a:srgbClr>
+                  </a:outerShdw>
+                </a:effectLst>
+                <a:latin typeface="Calibri" charset="0"/>
+                <a:ea typeface="+mj-ea"/>
+                <a:cs typeface="+mj-cs"/>
+              </a:rPr>
+              <a:t>rf</a:t>
+            </a:r>
+            <a:r>
+              <a:rPr lang="de-AT" sz="2000" b="1" dirty="0">
+                <a:solidFill>
+                  <a:srgbClr val="61A5C2"/>
+                </a:solidFill>
+                <a:effectLst>
+                  <a:outerShdw blurRad="38100" dist="38100" dir="2700000" algn="tl">
+                    <a:srgbClr val="000000">
+                      <a:alpha val="43137"/>
+                    </a:srgbClr>
+                  </a:outerShdw>
+                </a:effectLst>
+                <a:latin typeface="Calibri" charset="0"/>
+                <a:ea typeface="+mj-ea"/>
+                <a:cs typeface="+mj-cs"/>
+              </a:rPr>
+              <a:t>:</a:t>
+            </a:r>
+          </a:p>
+        </p:txBody>
+      </p:sp>
+      <p:sp>
+        <p:nvSpPr>
+          <p:cNvPr id="7" name="Rechteck 6">
+            <a:extLst>
+              <a:ext uri="{FF2B5EF4-FFF2-40B4-BE49-F238E27FC236}">
+                <a16:creationId xmlns:a16="http://schemas.microsoft.com/office/drawing/2014/main" id="{C9E9ABDA-450D-EECF-966E-C0601824F218}"/>
+              </a:ext>
+            </a:extLst>
+          </p:cNvPr>
+          <p:cNvSpPr/>
+          <p:nvPr/>
+        </p:nvSpPr>
+        <p:spPr>
+          <a:xfrm>
+            <a:off x="1047565" y="1730153"/>
+            <a:ext cx="3870664" cy="4993690"/>
+          </a:xfrm>
+          <a:prstGeom prst="rect">
+            <a:avLst/>
+          </a:prstGeom>
+        </p:spPr>
+        <p:style>
+          <a:lnRef idx="2">
+            <a:schemeClr val="dk1"/>
+          </a:lnRef>
+          <a:fillRef idx="1">
+            <a:schemeClr val="lt1"/>
+          </a:fillRef>
+          <a:effectRef idx="0">
+            <a:schemeClr val="dk1"/>
+          </a:effectRef>
+          <a:fontRef idx="minor">
+            <a:schemeClr val="dk1"/>
+          </a:fontRef>
+        </p:style>
+        <p:txBody>
+          <a:bodyPr rtlCol="0" anchor="ctr"/>
+          <a:lstStyle/>
+          <a:p>
+            <a:pPr algn="ctr"/>
+            <a:endParaRPr lang="en-AT"/>
+          </a:p>
+        </p:txBody>
+      </p:sp>
+      <p:sp>
+        <p:nvSpPr>
+          <p:cNvPr id="8" name="Rechteck 7">
+            <a:extLst>
+              <a:ext uri="{FF2B5EF4-FFF2-40B4-BE49-F238E27FC236}">
+                <a16:creationId xmlns:a16="http://schemas.microsoft.com/office/drawing/2014/main" id="{DE411EE1-5D8E-FE5A-0B47-65B4D16F57A2}"/>
+              </a:ext>
+            </a:extLst>
+          </p:cNvPr>
+          <p:cNvSpPr/>
+          <p:nvPr/>
+        </p:nvSpPr>
+        <p:spPr>
+          <a:xfrm>
+            <a:off x="6596109" y="1730153"/>
+            <a:ext cx="4012707" cy="4993690"/>
+          </a:xfrm>
+          <a:prstGeom prst="rect">
+            <a:avLst/>
+          </a:prstGeom>
+        </p:spPr>
+        <p:style>
+          <a:lnRef idx="2">
+            <a:schemeClr val="dk1"/>
+          </a:lnRef>
+          <a:fillRef idx="1">
+            <a:schemeClr val="lt1"/>
+          </a:fillRef>
+          <a:effectRef idx="0">
+            <a:schemeClr val="dk1"/>
+          </a:effectRef>
+          <a:fontRef idx="minor">
+            <a:schemeClr val="dk1"/>
+          </a:fontRef>
+        </p:style>
+        <p:txBody>
+          <a:bodyPr rtlCol="0" anchor="ctr"/>
+          <a:lstStyle/>
+          <a:p>
+            <a:pPr algn="ctr"/>
+            <a:endParaRPr lang="en-AT"/>
+          </a:p>
+        </p:txBody>
+      </p:sp>
+      <p:pic>
+        <p:nvPicPr>
+          <p:cNvPr id="11" name="Grafik 10">
+            <a:extLst>
+              <a:ext uri="{FF2B5EF4-FFF2-40B4-BE49-F238E27FC236}">
+                <a16:creationId xmlns:a16="http://schemas.microsoft.com/office/drawing/2014/main" id="{3C212B0D-658A-B894-8018-EADA90842305}"/>
+              </a:ext>
+            </a:extLst>
+          </p:cNvPr>
+          <p:cNvPicPr>
+            <a:picLocks noChangeAspect="1"/>
+          </p:cNvPicPr>
+          <p:nvPr/>
+        </p:nvPicPr>
+        <p:blipFill>
+          <a:blip r:embed="rId2"/>
+          <a:stretch>
+            <a:fillRect/>
+          </a:stretch>
+        </p:blipFill>
+        <p:spPr>
+          <a:xfrm>
+            <a:off x="1265878" y="1812381"/>
+            <a:ext cx="3430410" cy="2385575"/>
+          </a:xfrm>
+          <a:prstGeom prst="rect">
+            <a:avLst/>
+          </a:prstGeom>
+        </p:spPr>
+      </p:pic>
+      <p:pic>
+        <p:nvPicPr>
+          <p:cNvPr id="13" name="Grafik 12">
+            <a:extLst>
+              <a:ext uri="{FF2B5EF4-FFF2-40B4-BE49-F238E27FC236}">
+                <a16:creationId xmlns:a16="http://schemas.microsoft.com/office/drawing/2014/main" id="{1FD75C3A-8E96-7D89-20F9-DCC6714A6498}"/>
+              </a:ext>
+            </a:extLst>
+          </p:cNvPr>
+          <p:cNvPicPr>
+            <a:picLocks noChangeAspect="1"/>
+          </p:cNvPicPr>
+          <p:nvPr/>
+        </p:nvPicPr>
+        <p:blipFill>
+          <a:blip r:embed="rId3"/>
+          <a:stretch>
+            <a:fillRect/>
+          </a:stretch>
+        </p:blipFill>
+        <p:spPr>
+          <a:xfrm>
+            <a:off x="1266530" y="4197956"/>
+            <a:ext cx="3429758" cy="2385575"/>
+          </a:xfrm>
+          <a:prstGeom prst="rect">
+            <a:avLst/>
+          </a:prstGeom>
+        </p:spPr>
+      </p:pic>
+      <p:pic>
+        <p:nvPicPr>
+          <p:cNvPr id="15" name="Grafik 14">
+            <a:extLst>
+              <a:ext uri="{FF2B5EF4-FFF2-40B4-BE49-F238E27FC236}">
+                <a16:creationId xmlns:a16="http://schemas.microsoft.com/office/drawing/2014/main" id="{8D0BC6FA-64FF-FE83-3FBA-A9A4B3B49363}"/>
+              </a:ext>
+            </a:extLst>
+          </p:cNvPr>
+          <p:cNvPicPr>
+            <a:picLocks noChangeAspect="1"/>
+          </p:cNvPicPr>
+          <p:nvPr/>
+        </p:nvPicPr>
+        <p:blipFill>
+          <a:blip r:embed="rId4"/>
+          <a:stretch>
+            <a:fillRect/>
+          </a:stretch>
+        </p:blipFill>
+        <p:spPr>
+          <a:xfrm>
+            <a:off x="6848153" y="1831844"/>
+            <a:ext cx="3489176" cy="2433381"/>
+          </a:xfrm>
+          <a:prstGeom prst="rect">
+            <a:avLst/>
+          </a:prstGeom>
+        </p:spPr>
+      </p:pic>
+      <p:pic>
+        <p:nvPicPr>
+          <p:cNvPr id="17" name="Grafik 16">
+            <a:extLst>
+              <a:ext uri="{FF2B5EF4-FFF2-40B4-BE49-F238E27FC236}">
+                <a16:creationId xmlns:a16="http://schemas.microsoft.com/office/drawing/2014/main" id="{C997C09A-F6E4-FC8D-1C01-8F5292CC5C8D}"/>
+              </a:ext>
+            </a:extLst>
+          </p:cNvPr>
+          <p:cNvPicPr>
+            <a:picLocks noChangeAspect="1"/>
+          </p:cNvPicPr>
+          <p:nvPr/>
+        </p:nvPicPr>
+        <p:blipFill>
+          <a:blip r:embed="rId5"/>
+          <a:stretch>
+            <a:fillRect/>
+          </a:stretch>
+        </p:blipFill>
+        <p:spPr>
+          <a:xfrm>
+            <a:off x="6872081" y="4320214"/>
+            <a:ext cx="3441319" cy="2403629"/>
+          </a:xfrm>
+          <a:prstGeom prst="rect">
+            <a:avLst/>
+          </a:prstGeom>
+        </p:spPr>
+      </p:pic>
+    </p:spTree>
+    <p:extLst>
+      <p:ext uri="{BB962C8B-B14F-4D97-AF65-F5344CB8AC3E}">
+        <p14:creationId xmlns:p14="http://schemas.microsoft.com/office/powerpoint/2010/main" val="793156583"/>
+      </p:ext>
+    </p:extLst>
   </p:cSld>
   <p:clrMapOvr>
     <a:masterClrMapping/>
@@ -5467,8 +5951,8 @@
         </p:blipFill>
         <p:spPr>
           <a:xfrm>
-            <a:off x="2512060" y="1825625"/>
-            <a:ext cx="6786245" cy="4351655"/>
+            <a:off x="2234989" y="1584008"/>
+            <a:ext cx="7341021" cy="4707403"/>
           </a:xfrm>
           <a:prstGeom prst="rect">
             <a:avLst/>

</xml_diff>

<commit_message>
changed a B to b
</commit_message>
<xml_diff>
--- a/Exercise_2/Exercie2_slides.pptx
+++ b/Exercise_2/Exercie2_slides.pptx
@@ -6371,7 +6371,7 @@
         </p:nvSpPr>
         <p:spPr>
           <a:xfrm>
-            <a:off x="1877483" y="1859492"/>
+            <a:off x="1877483" y="1765488"/>
             <a:ext cx="8056033" cy="4351338"/>
           </a:xfrm>
         </p:spPr>
@@ -6391,85 +6391,85 @@
           </a:p>
           <a:p>
             <a:r>
+              <a:rPr lang="en-GB" sz="1800" dirty="0">
+                <a:solidFill>
+                  <a:srgbClr val="61A5C2"/>
+                </a:solidFill>
+                <a:latin typeface="Calibri" charset="0"/>
+              </a:rPr>
+              <a:t>Performance:</a:t>
+            </a:r>
+          </a:p>
+          <a:p>
+            <a:pPr lvl="1"/>
+            <a:r>
               <a:rPr lang="en-GB" sz="1600" dirty="0">
                 <a:solidFill>
                   <a:srgbClr val="61A5C2"/>
                 </a:solidFill>
                 <a:latin typeface="Calibri" charset="0"/>
               </a:rPr>
-              <a:t>Performance:</a:t>
+              <a:t>implementing the </a:t>
+            </a:r>
+            <a:r>
+              <a:rPr lang="en-GB" sz="1600" dirty="0" err="1">
+                <a:solidFill>
+                  <a:srgbClr val="61A5C2"/>
+                </a:solidFill>
+                <a:latin typeface="Calibri" charset="0"/>
+              </a:rPr>
+              <a:t>max_features</a:t>
+            </a:r>
+            <a:r>
+              <a:rPr lang="en-GB" sz="1600" dirty="0">
+                <a:solidFill>
+                  <a:srgbClr val="61A5C2"/>
+                </a:solidFill>
+                <a:latin typeface="Calibri" charset="0"/>
+              </a:rPr>
+              <a:t> functionality boosts both efficiency and effectiveness</a:t>
+            </a:r>
+          </a:p>
+          <a:p>
+            <a:pPr lvl="2"/>
+            <a:r>
+              <a:rPr lang="en-GB" dirty="0">
+                <a:solidFill>
+                  <a:srgbClr val="61A5C2"/>
+                </a:solidFill>
+                <a:latin typeface="Calibri" charset="0"/>
+              </a:rPr>
+              <a:t>especially choosing a random subset at every node</a:t>
+            </a:r>
+          </a:p>
+          <a:p>
+            <a:pPr lvl="2"/>
+            <a:r>
+              <a:rPr lang="en-GB" dirty="0">
+                <a:solidFill>
+                  <a:srgbClr val="61A5C2"/>
+                </a:solidFill>
+                <a:latin typeface="Calibri" charset="0"/>
+              </a:rPr>
+              <a:t>biggest difference between LLM  and our/Scikit’s RF</a:t>
             </a:r>
           </a:p>
           <a:p>
             <a:pPr lvl="1"/>
             <a:r>
-              <a:rPr lang="en-GB" sz="1400" dirty="0">
-                <a:solidFill>
-                  <a:srgbClr val="61A5C2"/>
-                </a:solidFill>
-                <a:latin typeface="Calibri" charset="0"/>
-              </a:rPr>
-              <a:t>implementing the </a:t>
-            </a:r>
-            <a:r>
-              <a:rPr lang="en-GB" sz="1400" dirty="0" err="1">
-                <a:solidFill>
-                  <a:srgbClr val="61A5C2"/>
-                </a:solidFill>
-                <a:latin typeface="Calibri" charset="0"/>
-              </a:rPr>
-              <a:t>max_features</a:t>
-            </a:r>
-            <a:r>
-              <a:rPr lang="en-GB" sz="1400" dirty="0">
-                <a:solidFill>
-                  <a:srgbClr val="61A5C2"/>
-                </a:solidFill>
-                <a:latin typeface="Calibri" charset="0"/>
-              </a:rPr>
-              <a:t> functionality boosts both efficiency and effectiveness</a:t>
-            </a:r>
-          </a:p>
-          <a:p>
-            <a:pPr lvl="2"/>
-            <a:r>
-              <a:rPr lang="en-GB" sz="1400" dirty="0">
-                <a:solidFill>
-                  <a:srgbClr val="61A5C2"/>
-                </a:solidFill>
-                <a:latin typeface="Calibri" charset="0"/>
-              </a:rPr>
-              <a:t>especially choosing a random subset at every node</a:t>
-            </a:r>
-          </a:p>
-          <a:p>
-            <a:pPr lvl="2"/>
-            <a:r>
-              <a:rPr lang="en-GB" sz="1400" dirty="0">
-                <a:solidFill>
-                  <a:srgbClr val="61A5C2"/>
-                </a:solidFill>
-                <a:latin typeface="Calibri" charset="0"/>
-              </a:rPr>
-              <a:t>Biggest difference between LLM  and our/Scikit’s RF</a:t>
+              <a:rPr lang="en-GB" sz="1600" dirty="0">
+                <a:solidFill>
+                  <a:srgbClr val="61A5C2"/>
+                </a:solidFill>
+                <a:latin typeface="Calibri" charset="0"/>
+              </a:rPr>
+              <a:t>randomising the subsets of instances for each tree improves performance</a:t>
             </a:r>
           </a:p>
           <a:p>
             <a:pPr lvl="1"/>
             <a:r>
-              <a:rPr lang="en-GB" sz="1400" dirty="0">
-                <a:solidFill>
-                  <a:srgbClr val="61A5C2"/>
-                </a:solidFill>
-                <a:latin typeface="Calibri" charset="0"/>
-              </a:rPr>
-              <a:t>randomising the subsets of instances for each tree improves performance</a:t>
-            </a:r>
-          </a:p>
-          <a:p>
-            <a:pPr lvl="1"/>
-            <a:r>
-              <a:rPr lang="en-GB" sz="1400" dirty="0" err="1">
+              <a:rPr lang="en-GB" sz="1600" dirty="0" err="1">
                 <a:solidFill>
                   <a:srgbClr val="61A5C2"/>
                 </a:solidFill>
@@ -6478,7 +6478,7 @@
               <a:t>min_samples_split</a:t>
             </a:r>
             <a:r>
-              <a:rPr lang="en-GB" sz="1400" dirty="0">
+              <a:rPr lang="en-GB" sz="1600" dirty="0">
                 <a:solidFill>
                   <a:srgbClr val="61A5C2"/>
                 </a:solidFill>
@@ -6491,6 +6491,35 @@
             <a:pPr marL="457200" lvl="1" indent="0">
               <a:buNone/>
             </a:pPr>
+            <a:endParaRPr lang="en-GB" sz="1600" dirty="0">
+              <a:solidFill>
+                <a:srgbClr val="61A5C2"/>
+              </a:solidFill>
+              <a:latin typeface="Calibri" charset="0"/>
+            </a:endParaRPr>
+          </a:p>
+          <a:p>
+            <a:r>
+              <a:rPr lang="en-GB" sz="1800" dirty="0">
+                <a:solidFill>
+                  <a:srgbClr val="61A5C2"/>
+                </a:solidFill>
+                <a:latin typeface="Calibri" charset="0"/>
+              </a:rPr>
+              <a:t>Efficiency:</a:t>
+            </a:r>
+          </a:p>
+          <a:p>
+            <a:pPr lvl="1"/>
+            <a:r>
+              <a:rPr lang="en-GB" sz="1600" dirty="0">
+                <a:solidFill>
+                  <a:srgbClr val="61A5C2"/>
+                </a:solidFill>
+                <a:latin typeface="Calibri" charset="0"/>
+              </a:rPr>
+              <a:t>parallelisation is necessary for application on bigger datasets</a:t>
+            </a:r>
             <a:endParaRPr lang="en-GB" sz="1400" dirty="0">
               <a:solidFill>
                 <a:srgbClr val="61A5C2"/>
@@ -6499,6 +6528,7 @@
             </a:endParaRPr>
           </a:p>
           <a:p>
+            <a:pPr lvl="1"/>
             <a:r>
               <a:rPr lang="en-GB" sz="1600" dirty="0">
                 <a:solidFill>
@@ -6506,43 +6536,13 @@
                 </a:solidFill>
                 <a:latin typeface="Calibri" charset="0"/>
               </a:rPr>
-              <a:t>Efficiency:</a:t>
+              <a:t>Scikit-Learn is very efficient; bigger difference in efficiency, not effectiveness</a:t>
             </a:r>
           </a:p>
           <a:p>
             <a:pPr lvl="1"/>
             <a:r>
-              <a:rPr lang="en-GB" sz="1400" dirty="0">
-                <a:solidFill>
-                  <a:srgbClr val="61A5C2"/>
-                </a:solidFill>
-                <a:latin typeface="Calibri" charset="0"/>
-              </a:rPr>
-              <a:t>parallelisation is necessary for application on bigger datasets</a:t>
-            </a:r>
-            <a:endParaRPr lang="en-GB" sz="1200" dirty="0">
-              <a:solidFill>
-                <a:srgbClr val="61A5C2"/>
-              </a:solidFill>
-              <a:latin typeface="Calibri" charset="0"/>
-            </a:endParaRPr>
-          </a:p>
-          <a:p>
-            <a:pPr lvl="1"/>
-            <a:r>
-              <a:rPr lang="en-GB" sz="1400" dirty="0">
-                <a:solidFill>
-                  <a:srgbClr val="61A5C2"/>
-                </a:solidFill>
-                <a:latin typeface="Calibri" charset="0"/>
-              </a:rPr>
-              <a:t>Scikit-Learn is very efficient; bigger difference in efficiency, not effectiveness</a:t>
-            </a:r>
-          </a:p>
-          <a:p>
-            <a:pPr lvl="1"/>
-            <a:r>
-              <a:rPr lang="en-GB" sz="1400" dirty="0" err="1">
+              <a:rPr lang="en-GB" sz="1600" dirty="0" err="1">
                 <a:solidFill>
                   <a:srgbClr val="61A5C2"/>
                 </a:solidFill>
@@ -6551,7 +6551,7 @@
               <a:t>kNN</a:t>
             </a:r>
             <a:r>
-              <a:rPr lang="en-GB" sz="1400" dirty="0">
+              <a:rPr lang="en-GB" sz="1600" dirty="0">
                 <a:solidFill>
                   <a:srgbClr val="61A5C2"/>
                 </a:solidFill>
@@ -6563,7 +6563,7 @@
           <a:p>
             <a:pPr lvl="2"/>
             <a:r>
-              <a:rPr lang="en-GB" sz="1400" dirty="0">
+              <a:rPr lang="en-GB" dirty="0">
                 <a:solidFill>
                   <a:srgbClr val="61A5C2"/>
                 </a:solidFill>
@@ -6575,7 +6575,7 @@
           <a:p>
             <a:pPr lvl="2"/>
             <a:r>
-              <a:rPr lang="en-GB" sz="1400" dirty="0">
+              <a:rPr lang="en-GB" dirty="0">
                 <a:solidFill>
                   <a:srgbClr val="61A5C2"/>
                 </a:solidFill>

</xml_diff>